<commit_message>
printea paso a paso
</commit_message>
<xml_diff>
--- a/presentacion/algoritmo A.pptx
+++ b/presentacion/algoritmo A.pptx
@@ -5,10 +5,10 @@
     <p:sldMasterId id="2147483672" r:id="rId1"/>
   </p:sldMasterIdLst>
   <p:notesMasterIdLst>
-    <p:notesMasterId r:id="rId16"/>
+    <p:notesMasterId r:id="rId17"/>
   </p:notesMasterIdLst>
   <p:handoutMasterIdLst>
-    <p:handoutMasterId r:id="rId17"/>
+    <p:handoutMasterId r:id="rId18"/>
   </p:handoutMasterIdLst>
   <p:sldIdLst>
     <p:sldId id="256" r:id="rId2"/>
@@ -24,7 +24,8 @@
     <p:sldId id="273" r:id="rId12"/>
     <p:sldId id="272" r:id="rId13"/>
     <p:sldId id="276" r:id="rId14"/>
-    <p:sldId id="260" r:id="rId15"/>
+    <p:sldId id="277" r:id="rId15"/>
+    <p:sldId id="260" r:id="rId16"/>
   </p:sldIdLst>
   <p:sldSz cx="12192000" cy="6858000"/>
   <p:notesSz cx="6858000" cy="9144000"/>
@@ -2445,17 +2446,9 @@
           </a:pPr>
           <a:r>
             <a:rPr lang="es-AR" dirty="0"/>
-            <a:t>Los nodos </a:t>
+            <a:t>Los nodos dis-conexos son llamados obstáculos</a:t>
           </a:r>
-          <a:r>
-            <a:rPr lang="es-AR" dirty="0" err="1"/>
-            <a:t>dis-conexos</a:t>
-          </a:r>
-          <a:r>
-            <a:rPr lang="es-AR"/>
-            <a:t> son llamados obstáculos</a:t>
-          </a:r>
-          <a:endParaRPr lang="en-US"/>
+          <a:endParaRPr lang="en-US" dirty="0"/>
         </a:p>
       </dgm:t>
     </dgm:pt>
@@ -2643,11 +2636,7 @@
           </a:pPr>
           <a:r>
             <a:rPr lang="es-AR" dirty="0"/>
-            <a:t>Distancia de </a:t>
-          </a:r>
-          <a:r>
-            <a:rPr lang="es-AR" dirty="0" err="1"/>
-            <a:t>Manhatan</a:t>
+            <a:t>Distancia de Manhattan</a:t>
           </a:r>
           <a:endParaRPr lang="en-US" dirty="0"/>
         </a:p>
@@ -2730,13 +2719,8 @@
           </a:pPr>
           <a:r>
             <a:rPr lang="es-AR" dirty="0"/>
-            <a:t>Distancia </a:t>
+            <a:t>Distancia Euclidiana</a:t>
           </a:r>
-          <a:r>
-            <a:rPr lang="es-AR" dirty="0" err="1"/>
-            <a:t>Euclideana</a:t>
-          </a:r>
-          <a:endParaRPr lang="es-AR" dirty="0"/>
         </a:p>
       </dgm:t>
     </dgm:pt>
@@ -3028,7 +3012,11 @@
           </a:r>
           <a:r>
             <a:rPr lang="es-ES" dirty="0" err="1"/>
-            <a:t>sinSalida</a:t>
+            <a:t>sinSalidapara</a:t>
+          </a:r>
+          <a:r>
+            <a:rPr lang="es-ES" dirty="0"/>
+            <a:t> mantener un registro de las casillas que se han explorado y no tienen salida</a:t>
           </a:r>
           <a:endParaRPr lang="en-US" dirty="0"/>
         </a:p>
@@ -3809,17 +3797,9 @@
           </a:pPr>
           <a:r>
             <a:rPr lang="es-AR" sz="2500" kern="1200" dirty="0"/>
-            <a:t>Los nodos </a:t>
+            <a:t>Los nodos dis-conexos son llamados obstáculos</a:t>
           </a:r>
-          <a:r>
-            <a:rPr lang="es-AR" sz="2500" kern="1200" dirty="0" err="1"/>
-            <a:t>dis-conexos</a:t>
-          </a:r>
-          <a:r>
-            <a:rPr lang="es-AR" sz="2500" kern="1200"/>
-            <a:t> son llamados obstáculos</a:t>
-          </a:r>
-          <a:endParaRPr lang="en-US" sz="2500" kern="1200"/>
+          <a:endParaRPr lang="en-US" sz="2500" kern="1200" dirty="0"/>
         </a:p>
       </dsp:txBody>
       <dsp:txXfrm>
@@ -3988,11 +3968,7 @@
           </a:pPr>
           <a:r>
             <a:rPr lang="es-AR" sz="2500" kern="1200" dirty="0"/>
-            <a:t>Distancia de </a:t>
-          </a:r>
-          <a:r>
-            <a:rPr lang="es-AR" sz="2500" kern="1200" dirty="0" err="1"/>
-            <a:t>Manhatan</a:t>
+            <a:t>Distancia de Manhattan</a:t>
           </a:r>
           <a:endParaRPr lang="en-US" sz="2500" kern="1200" dirty="0"/>
         </a:p>
@@ -4311,13 +4287,8 @@
           </a:pPr>
           <a:r>
             <a:rPr lang="es-AR" sz="2500" kern="1200" dirty="0"/>
-            <a:t>Distancia </a:t>
+            <a:t>Distancia Euclidiana</a:t>
           </a:r>
-          <a:r>
-            <a:rPr lang="es-AR" sz="2500" kern="1200" dirty="0" err="1"/>
-            <a:t>Euclideana</a:t>
-          </a:r>
-          <a:endParaRPr lang="es-AR" sz="2500" kern="1200" dirty="0"/>
         </a:p>
       </dsp:txBody>
       <dsp:txXfrm>
@@ -4655,7 +4626,11 @@
           </a:r>
           <a:r>
             <a:rPr lang="es-ES" sz="1500" kern="1200" dirty="0" err="1"/>
-            <a:t>sinSalida</a:t>
+            <a:t>sinSalidapara</a:t>
+          </a:r>
+          <a:r>
+            <a:rPr lang="es-ES" sz="1500" kern="1200" dirty="0"/>
+            <a:t> mantener un registro de las casillas que se han explorado y no tienen salida</a:t>
           </a:r>
           <a:endParaRPr lang="en-US" sz="1500" kern="1200" dirty="0"/>
         </a:p>
@@ -10233,7 +10208,7 @@
             <a:pPr rtl="0"/>
             <a:fld id="{C6B3AB32-59DF-41F1-9618-EDFBF5049629}" type="slidenum">
               <a:rPr lang="es-ES" smtClean="0"/>
-              <a:t>14</a:t>
+              <a:t>15</a:t>
             </a:fld>
             <a:endParaRPr lang="es-ES"/>
           </a:p>
@@ -14725,7 +14700,7 @@
           <p:nvPr>
             <p:extLst>
               <p:ext uri="{D42A27DB-BD31-4B8C-83A1-F6EECF244321}">
-                <p14:modId xmlns:p14="http://schemas.microsoft.com/office/powerpoint/2010/main" val="2219796329"/>
+                <p14:modId xmlns:p14="http://schemas.microsoft.com/office/powerpoint/2010/main" val="2226350313"/>
               </p:ext>
             </p:extLst>
           </p:nvPr>
@@ -15159,6 +15134,89 @@
 </file>
 
 <file path=ppt/slides/slide14.xml><?xml version="1.0" encoding="utf-8"?>
+<p:sld xmlns:a="http://schemas.openxmlformats.org/drawingml/2006/main" xmlns:r="http://schemas.openxmlformats.org/officeDocument/2006/relationships" xmlns:p="http://schemas.openxmlformats.org/presentationml/2006/main">
+  <p:cSld>
+    <p:spTree>
+      <p:nvGrpSpPr>
+        <p:cNvPr id="1" name=""/>
+        <p:cNvGrpSpPr/>
+        <p:nvPr/>
+      </p:nvGrpSpPr>
+      <p:grpSpPr>
+        <a:xfrm>
+          <a:off x="0" y="0"/>
+          <a:ext cx="0" cy="0"/>
+          <a:chOff x="0" y="0"/>
+          <a:chExt cx="0" cy="0"/>
+        </a:xfrm>
+      </p:grpSpPr>
+      <p:sp>
+        <p:nvSpPr>
+          <p:cNvPr id="2" name="Título 1">
+            <a:extLst>
+              <a:ext uri="{FF2B5EF4-FFF2-40B4-BE49-F238E27FC236}">
+                <a16:creationId xmlns:a16="http://schemas.microsoft.com/office/drawing/2014/main" id="{C0B15E2D-E772-B3EF-62F6-8ECF65F39809}"/>
+              </a:ext>
+            </a:extLst>
+          </p:cNvPr>
+          <p:cNvSpPr>
+            <a:spLocks noGrp="1"/>
+          </p:cNvSpPr>
+          <p:nvPr>
+            <p:ph type="title"/>
+          </p:nvPr>
+        </p:nvSpPr>
+        <p:spPr/>
+        <p:txBody>
+          <a:bodyPr/>
+          <a:lstStyle/>
+          <a:p>
+            <a:r>
+              <a:rPr lang="es-AR"/>
+              <a:t>Complejidad computacional???</a:t>
+            </a:r>
+          </a:p>
+        </p:txBody>
+      </p:sp>
+      <p:sp>
+        <p:nvSpPr>
+          <p:cNvPr id="3" name="Marcador de contenido 2">
+            <a:extLst>
+              <a:ext uri="{FF2B5EF4-FFF2-40B4-BE49-F238E27FC236}">
+                <a16:creationId xmlns:a16="http://schemas.microsoft.com/office/drawing/2014/main" id="{5FC98181-4B46-0618-DA13-658B8329AAD3}"/>
+              </a:ext>
+            </a:extLst>
+          </p:cNvPr>
+          <p:cNvSpPr>
+            <a:spLocks noGrp="1"/>
+          </p:cNvSpPr>
+          <p:nvPr>
+            <p:ph idx="1"/>
+          </p:nvPr>
+        </p:nvSpPr>
+        <p:spPr/>
+        <p:txBody>
+          <a:bodyPr/>
+          <a:lstStyle/>
+          <a:p>
+            <a:endParaRPr lang="es-AR"/>
+          </a:p>
+        </p:txBody>
+      </p:sp>
+    </p:spTree>
+    <p:extLst>
+      <p:ext uri="{BB962C8B-B14F-4D97-AF65-F5344CB8AC3E}">
+        <p14:creationId xmlns:p14="http://schemas.microsoft.com/office/powerpoint/2010/main" val="1832333674"/>
+      </p:ext>
+    </p:extLst>
+  </p:cSld>
+  <p:clrMapOvr>
+    <a:masterClrMapping/>
+  </p:clrMapOvr>
+</p:sld>
+</file>
+
+<file path=ppt/slides/slide15.xml><?xml version="1.0" encoding="utf-8"?>
 <p:sld xmlns:a="http://schemas.openxmlformats.org/drawingml/2006/main" xmlns:r="http://schemas.openxmlformats.org/officeDocument/2006/relationships" xmlns:p="http://schemas.openxmlformats.org/presentationml/2006/main">
   <p:cSld>
     <p:bg>
@@ -15869,11 +15927,7 @@
             </a:pPr>
             <a:r>
               <a:rPr lang="es-AR" dirty="0"/>
-              <a:t>Que nodos estarán </a:t>
-            </a:r>
-            <a:r>
-              <a:rPr lang="es-AR" dirty="0" err="1"/>
-              <a:t>dis-conexos</a:t>
+              <a:t>Que nodos estarán dis-conexos</a:t>
             </a:r>
             <a:br>
               <a:rPr lang="es-AR" dirty="0"/>
@@ -16080,7 +16134,7 @@
           <p:nvPr>
             <p:extLst>
               <p:ext uri="{D42A27DB-BD31-4B8C-83A1-F6EECF244321}">
-                <p14:modId xmlns:p14="http://schemas.microsoft.com/office/powerpoint/2010/main" val="2551300451"/>
+                <p14:modId xmlns:p14="http://schemas.microsoft.com/office/powerpoint/2010/main" val="4073152551"/>
               </p:ext>
             </p:extLst>
           </p:nvPr>
@@ -16191,13 +16245,8 @@
           <a:p>
             <a:r>
               <a:rPr lang="es-AR" dirty="0"/>
-              <a:t>Distancia de </a:t>
-            </a:r>
-            <a:r>
-              <a:rPr lang="es-AR" dirty="0" err="1"/>
-              <a:t>manhatan</a:t>
-            </a:r>
-            <a:endParaRPr lang="es-AR" dirty="0"/>
+              <a:t>Distancia de manhattan</a:t>
+            </a:r>
           </a:p>
         </p:txBody>
       </p:sp>
@@ -16230,152 +16279,111 @@
           <a:lstStyle/>
           <a:p>
             <a:r>
-              <a:rPr lang="en-US" dirty="0" err="1"/>
-              <a:t>Cuando</a:t>
-            </a:r>
-            <a:r>
-              <a:rPr lang="en-US" dirty="0"/>
-              <a:t> </a:t>
-            </a:r>
-            <a:r>
-              <a:rPr lang="en-US" dirty="0" err="1"/>
-              <a:t>tengo</a:t>
-            </a:r>
-            <a:r>
-              <a:rPr lang="en-US" dirty="0"/>
-              <a:t> 4 </a:t>
-            </a:r>
-            <a:r>
-              <a:rPr lang="en-US" dirty="0" err="1"/>
-              <a:t>posibles</a:t>
-            </a:r>
-            <a:r>
-              <a:rPr lang="en-US" dirty="0"/>
-              <a:t> </a:t>
-            </a:r>
-            <a:r>
-              <a:rPr lang="en-US" dirty="0" err="1"/>
-              <a:t>movimientos</a:t>
-            </a:r>
-            <a:r>
-              <a:rPr lang="en-US" dirty="0"/>
-              <a:t> </a:t>
+              <a:rPr lang="es-AR" dirty="0"/>
+              <a:t>Cuando tengo 4 posibles movimientos </a:t>
             </a:r>
           </a:p>
           <a:p>
             <a:r>
-              <a:rPr lang="en-US" dirty="0"/>
-              <a:t>Camino Azul </a:t>
-            </a:r>
-            <a:r>
-              <a:rPr lang="en-US" dirty="0" err="1"/>
-              <a:t>igual</a:t>
-            </a:r>
-            <a:r>
-              <a:rPr lang="en-US" dirty="0"/>
-              <a:t> que </a:t>
-            </a:r>
-            <a:r>
-              <a:rPr lang="en-US" dirty="0" err="1"/>
-              <a:t>el</a:t>
-            </a:r>
-            <a:r>
-              <a:rPr lang="en-US" dirty="0"/>
-              <a:t> </a:t>
-            </a:r>
-            <a:r>
-              <a:rPr lang="en-US" dirty="0" err="1"/>
-              <a:t>camino</a:t>
-            </a:r>
-            <a:r>
-              <a:rPr lang="en-US" dirty="0"/>
-              <a:t> </a:t>
-            </a:r>
-            <a:r>
-              <a:rPr lang="en-US" dirty="0" err="1"/>
-              <a:t>verde</a:t>
-            </a:r>
-            <a:endParaRPr lang="en-US" dirty="0"/>
+              <a:rPr lang="es-AR" dirty="0"/>
+              <a:t>Camino Azul igual que el camino verde</a:t>
+            </a:r>
           </a:p>
           <a:p>
             <a:r>
-              <a:rPr lang="en-US" dirty="0" err="1"/>
-              <a:t>Calculo</a:t>
-            </a:r>
-            <a:r>
-              <a:rPr lang="en-US" dirty="0"/>
-              <a:t> </a:t>
-            </a:r>
-            <a:r>
-              <a:rPr lang="en-US" dirty="0" err="1"/>
-              <a:t>Distancia</a:t>
-            </a:r>
-            <a:r>
-              <a:rPr lang="en-US" dirty="0"/>
-              <a:t> </a:t>
+              <a:rPr lang="es-AR" dirty="0"/>
+              <a:t>Calculo Distancia </a:t>
             </a:r>
           </a:p>
           <a:p>
             <a:pPr lvl="1"/>
             <a:r>
-              <a:rPr lang="en-US" sz="1800" dirty="0"/>
-              <a:t>dx = abs(</a:t>
-            </a:r>
-            <a:r>
-              <a:rPr lang="en-US" sz="1800" dirty="0" err="1"/>
+              <a:rPr lang="es-AR" sz="1800" dirty="0" err="1"/>
+              <a:t>dx</a:t>
+            </a:r>
+            <a:r>
+              <a:rPr lang="es-AR" sz="1800" dirty="0"/>
+              <a:t> = </a:t>
+            </a:r>
+            <a:r>
+              <a:rPr lang="es-AR" sz="1800" dirty="0" err="1"/>
+              <a:t>abs</a:t>
+            </a:r>
+            <a:r>
+              <a:rPr lang="es-AR" sz="1800" dirty="0"/>
+              <a:t>(</a:t>
+            </a:r>
+            <a:r>
+              <a:rPr lang="es-AR" sz="1800" dirty="0" err="1"/>
               <a:t>current_cell.x</a:t>
             </a:r>
             <a:r>
-              <a:rPr lang="en-US" sz="1800" dirty="0"/>
+              <a:rPr lang="es-AR" sz="1800" dirty="0"/>
               <a:t> – </a:t>
             </a:r>
             <a:r>
-              <a:rPr lang="en-US" sz="1800" dirty="0" err="1"/>
+              <a:rPr lang="es-AR" sz="1800" dirty="0" err="1"/>
               <a:t>goal.x</a:t>
             </a:r>
             <a:r>
-              <a:rPr lang="en-US" sz="1800" dirty="0"/>
+              <a:rPr lang="es-AR" sz="1800" dirty="0"/>
               <a:t>)</a:t>
             </a:r>
           </a:p>
           <a:p>
             <a:pPr lvl="1"/>
             <a:r>
-              <a:rPr lang="en-US" sz="1800" dirty="0" err="1"/>
+              <a:rPr lang="es-AR" sz="1800" dirty="0" err="1"/>
               <a:t>dy</a:t>
             </a:r>
             <a:r>
-              <a:rPr lang="en-US" sz="1800" dirty="0"/>
-              <a:t> = abs(</a:t>
-            </a:r>
-            <a:r>
-              <a:rPr lang="en-US" sz="1800" dirty="0" err="1"/>
+              <a:rPr lang="es-AR" sz="1800" dirty="0"/>
+              <a:t> = </a:t>
+            </a:r>
+            <a:r>
+              <a:rPr lang="es-AR" sz="1800" dirty="0" err="1"/>
+              <a:t>abs</a:t>
+            </a:r>
+            <a:r>
+              <a:rPr lang="es-AR" sz="1800" dirty="0"/>
+              <a:t>(</a:t>
+            </a:r>
+            <a:r>
+              <a:rPr lang="es-AR" sz="1800" dirty="0" err="1"/>
               <a:t>current_cell.y</a:t>
             </a:r>
             <a:r>
-              <a:rPr lang="en-US" sz="1800" dirty="0"/>
+              <a:rPr lang="es-AR" sz="1800" dirty="0"/>
               <a:t> – </a:t>
             </a:r>
             <a:r>
-              <a:rPr lang="en-US" sz="1800" dirty="0" err="1"/>
+              <a:rPr lang="es-AR" sz="1800" dirty="0" err="1"/>
               <a:t>goal.y</a:t>
             </a:r>
             <a:r>
-              <a:rPr lang="en-US" sz="1800" dirty="0"/>
+              <a:rPr lang="es-AR" sz="1800" dirty="0"/>
               <a:t>)</a:t>
             </a:r>
           </a:p>
           <a:p>
             <a:pPr lvl="1"/>
             <a:r>
-              <a:rPr lang="en-US" sz="1800" dirty="0"/>
-              <a:t>h = dx + </a:t>
-            </a:r>
-            <a:r>
-              <a:rPr lang="en-US" sz="1800" dirty="0" err="1"/>
+              <a:rPr lang="es-AR" sz="1800" dirty="0"/>
+              <a:t>h = </a:t>
+            </a:r>
+            <a:r>
+              <a:rPr lang="es-AR" sz="1800" dirty="0" err="1"/>
+              <a:t>dx</a:t>
+            </a:r>
+            <a:r>
+              <a:rPr lang="es-AR" sz="1800" dirty="0"/>
+              <a:t> + </a:t>
+            </a:r>
+            <a:r>
+              <a:rPr lang="es-AR" sz="1800" dirty="0" err="1"/>
               <a:t>dy</a:t>
             </a:r>
-            <a:endParaRPr lang="en-US" sz="1800" dirty="0"/>
+            <a:endParaRPr lang="es-AR" sz="1800" dirty="0"/>
           </a:p>
         </p:txBody>
       </p:sp>
@@ -16507,72 +16515,15 @@
           <a:lstStyle/>
           <a:p>
             <a:r>
-              <a:rPr lang="en-US" dirty="0"/>
-              <a:t>El Camino mas </a:t>
-            </a:r>
-            <a:r>
-              <a:rPr lang="en-US" dirty="0" err="1"/>
-              <a:t>corto</a:t>
-            </a:r>
-            <a:r>
-              <a:rPr lang="en-US" dirty="0"/>
-              <a:t> es la diagonal hasta </a:t>
-            </a:r>
-            <a:r>
-              <a:rPr lang="en-US" dirty="0" err="1"/>
-              <a:t>llegar</a:t>
-            </a:r>
-            <a:r>
-              <a:rPr lang="en-US" dirty="0"/>
-              <a:t> a la fila o </a:t>
-            </a:r>
-            <a:r>
-              <a:rPr lang="en-US" dirty="0" err="1"/>
-              <a:t>columna</a:t>
-            </a:r>
-            <a:r>
-              <a:rPr lang="en-US" dirty="0"/>
-              <a:t> del </a:t>
-            </a:r>
-            <a:r>
-              <a:rPr lang="en-US" dirty="0" err="1"/>
-              <a:t>objetivo</a:t>
-            </a:r>
-            <a:r>
-              <a:rPr lang="en-US" dirty="0"/>
-              <a:t> y de ahi </a:t>
-            </a:r>
-            <a:r>
-              <a:rPr lang="en-US" dirty="0" err="1"/>
-              <a:t>seguir</a:t>
-            </a:r>
-            <a:r>
-              <a:rPr lang="en-US" dirty="0"/>
-              <a:t> </a:t>
-            </a:r>
-            <a:r>
-              <a:rPr lang="en-US" dirty="0" err="1"/>
-              <a:t>el</a:t>
-            </a:r>
-            <a:r>
-              <a:rPr lang="en-US" dirty="0"/>
-              <a:t> </a:t>
-            </a:r>
-            <a:r>
-              <a:rPr lang="en-US" dirty="0" err="1"/>
-              <a:t>camino</a:t>
-            </a:r>
-            <a:r>
-              <a:rPr lang="en-US" dirty="0"/>
-              <a:t> recto.</a:t>
+              <a:rPr lang="es-AR" dirty="0"/>
+              <a:t>El Camino más corto es la diagonal hasta llegar a la fila o columna del objetivo y de ahi seguir el camino recto.</a:t>
             </a:r>
           </a:p>
           <a:p>
             <a:r>
-              <a:rPr lang="en-US" dirty="0" err="1"/>
-              <a:t>Calculo</a:t>
-            </a:r>
-            <a:endParaRPr lang="en-US" dirty="0"/>
+              <a:rPr lang="es-AR" dirty="0"/>
+              <a:t>Cálculo</a:t>
+            </a:r>
           </a:p>
           <a:p>
             <a:pPr lvl="1"/>
@@ -16654,7 +16605,7 @@
               <a:t>D es la </a:t>
             </a:r>
             <a:r>
-              <a:rPr lang="en-US" dirty="0" err="1"/>
+              <a:rPr lang="es-AR" dirty="0"/>
               <a:t>distancia</a:t>
             </a:r>
             <a:r>

</xml_diff>